<commit_message>
Updated Relazione e Diagrammi
</commit_message>
<xml_diff>
--- a/Relazione/Architettura Progetto SDCC Mazzola Alessio.pptx
+++ b/Relazione/Architettura Progetto SDCC Mazzola Alessio.pptx
@@ -10,8 +10,8 @@
   <p:sldIdLst>
     <p:sldId id="256" r:id="rId2"/>
     <p:sldId id="257" r:id="rId3"/>
-    <p:sldId id="262" r:id="rId4"/>
-    <p:sldId id="304" r:id="rId5"/>
+    <p:sldId id="304" r:id="rId4"/>
+    <p:sldId id="262" r:id="rId5"/>
     <p:sldId id="305" r:id="rId6"/>
     <p:sldId id="306" r:id="rId7"/>
     <p:sldId id="307" r:id="rId8"/>
@@ -291,6 +291,11 @@
           </p15:clr>
         </p15:guide>
         <p15:guide id="3" orient="horz" pos="2871">
+          <p15:clr>
+            <a:srgbClr val="A4A3A4"/>
+          </p15:clr>
+        </p15:guide>
+        <p15:guide id="4" pos="2880">
           <p15:clr>
             <a:srgbClr val="A4A3A4"/>
           </p15:clr>
@@ -1047,6 +1052,11 @@
         </p:txBody>
       </p:sp>
     </p:spTree>
+    <p:extLst>
+      <p:ext uri="{BB962C8B-B14F-4D97-AF65-F5344CB8AC3E}">
+        <p14:creationId xmlns:p14="http://schemas.microsoft.com/office/powerpoint/2010/main" val="21109182"/>
+      </p:ext>
+    </p:extLst>
   </p:cSld>
   <p:clrMapOvr>
     <a:masterClrMapping/>
@@ -1151,11 +1161,6 @@
         </p:txBody>
       </p:sp>
     </p:spTree>
-    <p:extLst>
-      <p:ext uri="{BB962C8B-B14F-4D97-AF65-F5344CB8AC3E}">
-        <p14:creationId xmlns:p14="http://schemas.microsoft.com/office/powerpoint/2010/main" val="21109182"/>
-      </p:ext>
-    </p:extLst>
   </p:cSld>
   <p:clrMapOvr>
     <a:masterClrMapping/>
@@ -7006,183 +7011,6 @@
             <a:pPr algn="just"/>
             <a:r>
               <a:rPr lang="it-IT" dirty="0"/>
-              <a:t>Avere a disposizione una architettura </a:t>
-            </a:r>
-            <a:r>
-              <a:rPr lang="it-IT" dirty="0" err="1"/>
-              <a:t>serverless</a:t>
-            </a:r>
-            <a:r>
-              <a:rPr lang="it-IT" dirty="0"/>
-              <a:t> significa che gli sviluppatori potranno concentrare la loro attenzione sull’applicativo andando a tralasciare gli aspetti e la gestione del funzionamento del server che esegue </a:t>
-            </a:r>
-            <a:r>
-              <a:rPr lang="it-IT" dirty="0" err="1"/>
-              <a:t>l’host</a:t>
-            </a:r>
-            <a:r>
-              <a:rPr lang="it-IT" dirty="0"/>
-              <a:t> dell’applicazione stessa.</a:t>
-            </a:r>
-          </a:p>
-          <a:p>
-            <a:pPr algn="just"/>
-            <a:r>
-              <a:rPr lang="it-IT" dirty="0"/>
-              <a:t>Il focus dello sviluppatore ricade sulle singole funzioni presenti all’interno dell’applicativo.</a:t>
-            </a:r>
-          </a:p>
-          <a:p>
-            <a:pPr algn="just"/>
-            <a:r>
-              <a:rPr lang="it-IT" dirty="0"/>
-              <a:t>Gli sviluppatori non necessitano di occuparsi dell’hardware dell’architettura.</a:t>
-            </a:r>
-          </a:p>
-        </p:txBody>
-      </p:sp>
-      <p:sp>
-        <p:nvSpPr>
-          <p:cNvPr id="244" name="Google Shape;244;p38"/>
-          <p:cNvSpPr txBox="1">
-            <a:spLocks noGrp="1"/>
-          </p:cNvSpPr>
-          <p:nvPr>
-            <p:ph type="title"/>
-          </p:nvPr>
-        </p:nvSpPr>
-        <p:spPr>
-          <a:xfrm>
-            <a:off x="0" y="216225"/>
-            <a:ext cx="9144000" cy="913800"/>
-          </a:xfrm>
-          <a:prstGeom prst="rect">
-            <a:avLst/>
-          </a:prstGeom>
-        </p:spPr>
-        <p:txBody>
-          <a:bodyPr spcFirstLastPara="1" wrap="square" lIns="91425" tIns="91425" rIns="91425" bIns="91425" anchor="b" anchorCtr="0">
-            <a:noAutofit/>
-          </a:bodyPr>
-          <a:lstStyle/>
-          <a:p>
-            <a:pPr lvl="0"/>
-            <a:r>
-              <a:rPr lang="it-IT" sz="2400" dirty="0"/>
-              <a:t>Perché </a:t>
-            </a:r>
-            <a:r>
-              <a:rPr lang="it-IT" sz="2400" dirty="0" err="1"/>
-              <a:t>Serverless</a:t>
-            </a:r>
-            <a:r>
-              <a:rPr lang="it-IT" sz="2400" dirty="0"/>
-              <a:t>?</a:t>
-            </a:r>
-            <a:endParaRPr sz="2400" dirty="0"/>
-          </a:p>
-        </p:txBody>
-      </p:sp>
-      <p:sp>
-        <p:nvSpPr>
-          <p:cNvPr id="245" name="Google Shape;245;p38"/>
-          <p:cNvSpPr txBox="1">
-            <a:spLocks noGrp="1"/>
-          </p:cNvSpPr>
-          <p:nvPr>
-            <p:ph type="sldNum" idx="12"/>
-          </p:nvPr>
-        </p:nvSpPr>
-        <p:spPr>
-          <a:xfrm>
-            <a:off x="8548658" y="4663217"/>
-            <a:ext cx="548700" cy="393600"/>
-          </a:xfrm>
-          <a:prstGeom prst="rect">
-            <a:avLst/>
-          </a:prstGeom>
-        </p:spPr>
-        <p:txBody>
-          <a:bodyPr spcFirstLastPara="1" wrap="square" lIns="91425" tIns="91425" rIns="91425" bIns="91425" anchor="ctr" anchorCtr="0">
-            <a:noAutofit/>
-          </a:bodyPr>
-          <a:lstStyle/>
-          <a:p>
-            <a:pPr marL="0" lvl="0" indent="0" algn="l" rtl="0">
-              <a:spcBef>
-                <a:spcPts val="0"/>
-              </a:spcBef>
-              <a:spcAft>
-                <a:spcPts val="0"/>
-              </a:spcAft>
-              <a:buClr>
-                <a:srgbClr val="000000"/>
-              </a:buClr>
-              <a:buSzPts val="1100"/>
-              <a:buFont typeface="Arial"/>
-              <a:buNone/>
-            </a:pPr>
-            <a:fld id="{00000000-1234-1234-1234-123412341234}" type="slidenum">
-              <a:rPr lang="es"/>
-              <a:t>3</a:t>
-            </a:fld>
-            <a:endParaRPr/>
-          </a:p>
-        </p:txBody>
-      </p:sp>
-    </p:spTree>
-  </p:cSld>
-  <p:clrMapOvr>
-    <a:masterClrMapping/>
-  </p:clrMapOvr>
-</p:sld>
-</file>
-
-<file path=ppt/slides/slide4.xml><?xml version="1.0" encoding="utf-8"?>
-<p:sld xmlns:a="http://schemas.openxmlformats.org/drawingml/2006/main" xmlns:r="http://schemas.openxmlformats.org/officeDocument/2006/relationships" xmlns:p="http://schemas.openxmlformats.org/presentationml/2006/main">
-  <p:cSld>
-    <p:spTree>
-      <p:nvGrpSpPr>
-        <p:cNvPr id="1" name="Shape 242"/>
-        <p:cNvGrpSpPr/>
-        <p:nvPr/>
-      </p:nvGrpSpPr>
-      <p:grpSpPr>
-        <a:xfrm>
-          <a:off x="0" y="0"/>
-          <a:ext cx="0" cy="0"/>
-          <a:chOff x="0" y="0"/>
-          <a:chExt cx="0" cy="0"/>
-        </a:xfrm>
-      </p:grpSpPr>
-      <p:sp>
-        <p:nvSpPr>
-          <p:cNvPr id="243" name="Google Shape;243;p38"/>
-          <p:cNvSpPr txBox="1">
-            <a:spLocks noGrp="1"/>
-          </p:cNvSpPr>
-          <p:nvPr>
-            <p:ph type="body" idx="1"/>
-          </p:nvPr>
-        </p:nvSpPr>
-        <p:spPr>
-          <a:xfrm>
-            <a:off x="1454050" y="1604682"/>
-            <a:ext cx="5877000" cy="2802243"/>
-          </a:xfrm>
-          <a:prstGeom prst="rect">
-            <a:avLst/>
-          </a:prstGeom>
-        </p:spPr>
-        <p:txBody>
-          <a:bodyPr spcFirstLastPara="1" wrap="square" lIns="91425" tIns="91425" rIns="91425" bIns="91425" anchor="t" anchorCtr="0">
-            <a:noAutofit/>
-          </a:bodyPr>
-          <a:lstStyle/>
-          <a:p>
-            <a:pPr algn="just"/>
-            <a:r>
-              <a:rPr lang="it-IT" dirty="0"/>
               <a:t>L’architettura </a:t>
             </a:r>
             <a:r>
@@ -7325,7 +7153,7 @@
             </a:pPr>
             <a:fld id="{00000000-1234-1234-1234-123412341234}" type="slidenum">
               <a:rPr lang="es"/>
-              <a:t>4</a:t>
+              <a:t>3</a:t>
             </a:fld>
             <a:endParaRPr/>
           </a:p>
@@ -7337,6 +7165,183 @@
         <p14:creationId xmlns:p14="http://schemas.microsoft.com/office/powerpoint/2010/main" val="3732830455"/>
       </p:ext>
     </p:extLst>
+  </p:cSld>
+  <p:clrMapOvr>
+    <a:masterClrMapping/>
+  </p:clrMapOvr>
+</p:sld>
+</file>
+
+<file path=ppt/slides/slide4.xml><?xml version="1.0" encoding="utf-8"?>
+<p:sld xmlns:a="http://schemas.openxmlformats.org/drawingml/2006/main" xmlns:r="http://schemas.openxmlformats.org/officeDocument/2006/relationships" xmlns:p="http://schemas.openxmlformats.org/presentationml/2006/main">
+  <p:cSld>
+    <p:spTree>
+      <p:nvGrpSpPr>
+        <p:cNvPr id="1" name="Shape 242"/>
+        <p:cNvGrpSpPr/>
+        <p:nvPr/>
+      </p:nvGrpSpPr>
+      <p:grpSpPr>
+        <a:xfrm>
+          <a:off x="0" y="0"/>
+          <a:ext cx="0" cy="0"/>
+          <a:chOff x="0" y="0"/>
+          <a:chExt cx="0" cy="0"/>
+        </a:xfrm>
+      </p:grpSpPr>
+      <p:sp>
+        <p:nvSpPr>
+          <p:cNvPr id="243" name="Google Shape;243;p38"/>
+          <p:cNvSpPr txBox="1">
+            <a:spLocks noGrp="1"/>
+          </p:cNvSpPr>
+          <p:nvPr>
+            <p:ph type="body" idx="1"/>
+          </p:nvPr>
+        </p:nvSpPr>
+        <p:spPr>
+          <a:xfrm>
+            <a:off x="1454050" y="1604682"/>
+            <a:ext cx="5877000" cy="2802243"/>
+          </a:xfrm>
+          <a:prstGeom prst="rect">
+            <a:avLst/>
+          </a:prstGeom>
+        </p:spPr>
+        <p:txBody>
+          <a:bodyPr spcFirstLastPara="1" wrap="square" lIns="91425" tIns="91425" rIns="91425" bIns="91425" anchor="t" anchorCtr="0">
+            <a:noAutofit/>
+          </a:bodyPr>
+          <a:lstStyle/>
+          <a:p>
+            <a:pPr algn="just"/>
+            <a:r>
+              <a:rPr lang="it-IT" dirty="0"/>
+              <a:t>Avere a disposizione una architettura </a:t>
+            </a:r>
+            <a:r>
+              <a:rPr lang="it-IT" dirty="0" err="1"/>
+              <a:t>serverless</a:t>
+            </a:r>
+            <a:r>
+              <a:rPr lang="it-IT" dirty="0"/>
+              <a:t> significa che gli sviluppatori potranno concentrare la loro attenzione sull’applicativo andando a tralasciare gli aspetti e la gestione del funzionamento del server che esegue </a:t>
+            </a:r>
+            <a:r>
+              <a:rPr lang="it-IT" dirty="0" err="1"/>
+              <a:t>l’host</a:t>
+            </a:r>
+            <a:r>
+              <a:rPr lang="it-IT" dirty="0"/>
+              <a:t> dell’applicazione stessa.</a:t>
+            </a:r>
+          </a:p>
+          <a:p>
+            <a:pPr algn="just"/>
+            <a:r>
+              <a:rPr lang="it-IT" dirty="0"/>
+              <a:t>Il focus dello sviluppatore ricade sulle singole funzioni presenti all’interno dell’applicativo.</a:t>
+            </a:r>
+          </a:p>
+          <a:p>
+            <a:pPr algn="just"/>
+            <a:r>
+              <a:rPr lang="it-IT" dirty="0"/>
+              <a:t>Gli sviluppatori non necessitano di occuparsi dell’hardware dell’architettura.</a:t>
+            </a:r>
+          </a:p>
+        </p:txBody>
+      </p:sp>
+      <p:sp>
+        <p:nvSpPr>
+          <p:cNvPr id="244" name="Google Shape;244;p38"/>
+          <p:cNvSpPr txBox="1">
+            <a:spLocks noGrp="1"/>
+          </p:cNvSpPr>
+          <p:nvPr>
+            <p:ph type="title"/>
+          </p:nvPr>
+        </p:nvSpPr>
+        <p:spPr>
+          <a:xfrm>
+            <a:off x="0" y="216225"/>
+            <a:ext cx="9144000" cy="913800"/>
+          </a:xfrm>
+          <a:prstGeom prst="rect">
+            <a:avLst/>
+          </a:prstGeom>
+        </p:spPr>
+        <p:txBody>
+          <a:bodyPr spcFirstLastPara="1" wrap="square" lIns="91425" tIns="91425" rIns="91425" bIns="91425" anchor="b" anchorCtr="0">
+            <a:noAutofit/>
+          </a:bodyPr>
+          <a:lstStyle/>
+          <a:p>
+            <a:pPr lvl="0"/>
+            <a:r>
+              <a:rPr lang="it-IT" sz="2400" dirty="0"/>
+              <a:t>Perché </a:t>
+            </a:r>
+            <a:r>
+              <a:rPr lang="it-IT" sz="2400" dirty="0" err="1"/>
+              <a:t>Serverless</a:t>
+            </a:r>
+            <a:r>
+              <a:rPr lang="it-IT" sz="2400" dirty="0"/>
+              <a:t>? </a:t>
+            </a:r>
+            <a:endParaRPr sz="2400" dirty="0"/>
+          </a:p>
+        </p:txBody>
+      </p:sp>
+      <p:sp>
+        <p:nvSpPr>
+          <p:cNvPr id="245" name="Google Shape;245;p38"/>
+          <p:cNvSpPr txBox="1">
+            <a:spLocks noGrp="1"/>
+          </p:cNvSpPr>
+          <p:nvPr>
+            <p:ph type="sldNum" idx="12"/>
+          </p:nvPr>
+        </p:nvSpPr>
+        <p:spPr>
+          <a:xfrm>
+            <a:off x="8548658" y="4663217"/>
+            <a:ext cx="548700" cy="393600"/>
+          </a:xfrm>
+          <a:prstGeom prst="rect">
+            <a:avLst/>
+          </a:prstGeom>
+        </p:spPr>
+        <p:txBody>
+          <a:bodyPr spcFirstLastPara="1" wrap="square" lIns="91425" tIns="91425" rIns="91425" bIns="91425" anchor="ctr" anchorCtr="0">
+            <a:noAutofit/>
+          </a:bodyPr>
+          <a:lstStyle/>
+          <a:p>
+            <a:pPr marL="0" lvl="0" indent="0" algn="l" rtl="0">
+              <a:spcBef>
+                <a:spcPts val="0"/>
+              </a:spcBef>
+              <a:spcAft>
+                <a:spcPts val="0"/>
+              </a:spcAft>
+              <a:buClr>
+                <a:srgbClr val="000000"/>
+              </a:buClr>
+              <a:buSzPts val="1100"/>
+              <a:buFont typeface="Arial"/>
+              <a:buNone/>
+            </a:pPr>
+            <a:fld id="{00000000-1234-1234-1234-123412341234}" type="slidenum">
+              <a:rPr lang="es"/>
+              <a:t>4</a:t>
+            </a:fld>
+            <a:endParaRPr/>
+          </a:p>
+        </p:txBody>
+      </p:sp>
+    </p:spTree>
   </p:cSld>
   <p:clrMapOvr>
     <a:masterClrMapping/>
@@ -7588,7 +7593,7 @@
             </a:r>
             <a:r>
               <a:rPr lang="it-IT" dirty="0"/>
-              <a:t> e di </a:t>
+              <a:t> e </a:t>
             </a:r>
             <a:r>
               <a:rPr lang="it-IT" dirty="0" err="1"/>

</xml_diff>